<commit_message>
update SOAR with wasm files
binary code verifier and also introduce SOAR build flow
</commit_message>
<xml_diff>
--- a/ApplicationDeveloperGuide/pptx/binary_code_verifier.pptx
+++ b/ApplicationDeveloperGuide/pptx/binary_code_verifier.pptx
@@ -5,14 +5,13 @@
     <p:sldMasterId id="2147483804" r:id="rId1"/>
   </p:sldMasterIdLst>
   <p:notesMasterIdLst>
-    <p:notesMasterId r:id="rId4"/>
+    <p:notesMasterId r:id="rId3"/>
   </p:notesMasterIdLst>
   <p:handoutMasterIdLst>
-    <p:handoutMasterId r:id="rId5"/>
+    <p:handoutMasterId r:id="rId4"/>
   </p:handoutMasterIdLst>
   <p:sldIdLst>
     <p:sldId id="7621" r:id="rId2"/>
-    <p:sldId id="7620" r:id="rId3"/>
   </p:sldIdLst>
   <p:sldSz cx="12192000" cy="6858000"/>
   <p:notesSz cx="6858000" cy="9144000"/>
@@ -231,7 +230,7 @@
               <a:rPr lang="fr-FR" smtClean="0">
                 <a:latin typeface="Calibri Regular" charset="0"/>
               </a:rPr>
-              <a:t>mercredi 20 septembre 2023</a:t>
+              <a:t>vendredi 20 décembre 2024</a:t>
             </a:fld>
             <a:endParaRPr lang="en-US" dirty="0">
               <a:latin typeface="Calibri Regular" charset="0"/>
@@ -409,7 +408,7 @@
           <a:p>
             <a:fld id="{885721CF-495B-2B41-A23A-4D3221F80235}" type="datetime2">
               <a:rPr lang="fr-FR" smtClean="0"/>
-              <a:t>mercredi 20 septembre 2023</a:t>
+              <a:t>vendredi 20 décembre 2024</a:t>
             </a:fld>
             <a:endParaRPr lang="en-US" dirty="0"/>
           </a:p>
@@ -680,96 +679,6 @@
     </a:lvl9pPr>
   </p:notesStyle>
 </p:notesMaster>
-</file>
-
-<file path=ppt/notesSlides/notesSlide1.xml><?xml version="1.0" encoding="utf-8"?>
-<p:notes xmlns:a="http://schemas.openxmlformats.org/drawingml/2006/main" xmlns:r="http://schemas.openxmlformats.org/officeDocument/2006/relationships" xmlns:p="http://schemas.openxmlformats.org/presentationml/2006/main">
-  <p:cSld>
-    <p:spTree>
-      <p:nvGrpSpPr>
-        <p:cNvPr id="1" name=""/>
-        <p:cNvGrpSpPr/>
-        <p:nvPr/>
-      </p:nvGrpSpPr>
-      <p:grpSpPr>
-        <a:xfrm>
-          <a:off x="0" y="0"/>
-          <a:ext cx="0" cy="0"/>
-          <a:chOff x="0" y="0"/>
-          <a:chExt cx="0" cy="0"/>
-        </a:xfrm>
-      </p:grpSpPr>
-      <p:sp>
-        <p:nvSpPr>
-          <p:cNvPr id="2" name="Slide Image Placeholder 1"/>
-          <p:cNvSpPr>
-            <a:spLocks noGrp="1" noRot="1" noChangeAspect="1"/>
-          </p:cNvSpPr>
-          <p:nvPr>
-            <p:ph type="sldImg"/>
-          </p:nvPr>
-        </p:nvSpPr>
-        <p:spPr/>
-      </p:sp>
-      <p:sp>
-        <p:nvSpPr>
-          <p:cNvPr id="3" name="Notes Placeholder 2"/>
-          <p:cNvSpPr>
-            <a:spLocks noGrp="1"/>
-          </p:cNvSpPr>
-          <p:nvPr>
-            <p:ph type="body" idx="1"/>
-          </p:nvPr>
-        </p:nvSpPr>
-        <p:spPr/>
-        <p:txBody>
-          <a:bodyPr/>
-          <a:lstStyle/>
-          <a:p>
-            <a:endParaRPr lang="en-US" dirty="0"/>
-          </a:p>
-        </p:txBody>
-      </p:sp>
-      <p:sp>
-        <p:nvSpPr>
-          <p:cNvPr id="4" name="Slide Number Placeholder 3"/>
-          <p:cNvSpPr>
-            <a:spLocks noGrp="1"/>
-          </p:cNvSpPr>
-          <p:nvPr>
-            <p:ph type="sldNum" sz="quarter" idx="10"/>
-          </p:nvPr>
-        </p:nvSpPr>
-        <p:spPr/>
-        <p:txBody>
-          <a:bodyPr/>
-          <a:lstStyle/>
-          <a:p>
-            <a:pPr>
-              <a:defRPr/>
-            </a:pPr>
-            <a:fld id="{78B372D7-DEE0-450A-82D1-DA2634523B10}" type="slidenum">
-              <a:rPr lang="fr-FR" smtClean="0"/>
-              <a:pPr>
-                <a:defRPr/>
-              </a:pPr>
-              <a:t>2</a:t>
-            </a:fld>
-            <a:endParaRPr lang="fr-FR"/>
-          </a:p>
-        </p:txBody>
-      </p:sp>
-    </p:spTree>
-    <p:extLst>
-      <p:ext uri="{BB962C8B-B14F-4D97-AF65-F5344CB8AC3E}">
-        <p14:creationId xmlns:p14="http://schemas.microsoft.com/office/powerpoint/2010/main" val="816031056"/>
-      </p:ext>
-    </p:extLst>
-  </p:cSld>
-  <p:clrMapOvr>
-    <a:masterClrMapping/>
-  </p:clrMapOvr>
-</p:notes>
 </file>
 
 <file path=ppt/slideLayouts/slideLayout1.xml><?xml version="1.0" encoding="utf-8"?>
@@ -4249,7 +4158,10 @@
           <a:bodyPr/>
           <a:lstStyle/>
           <a:p>
-            <a:endParaRPr lang="en-US"/>
+            <a:r>
+              <a:rPr lang="en-US" dirty="0"/>
+              <a:t>Binary Code verifier</a:t>
+            </a:r>
           </a:p>
         </p:txBody>
       </p:sp>
@@ -4397,7 +4309,7 @@
         <p:spPr>
           <a:xfrm>
             <a:off x="2844936" y="3113477"/>
-            <a:ext cx="601447" cy="246221"/>
+            <a:ext cx="1059906" cy="246221"/>
           </a:xfrm>
           <a:prstGeom prst="rect">
             <a:avLst/>
@@ -4419,7 +4331,23 @@
                   <a:srgbClr val="97A7AF"/>
                 </a:solidFill>
               </a:rPr>
-              <a:t>(*.class)</a:t>
+              <a:t>(*.class, *.</a:t>
+            </a:r>
+            <a:r>
+              <a:rPr lang="en-US" sz="1000" dirty="0" err="1">
+                <a:solidFill>
+                  <a:srgbClr val="97A7AF"/>
+                </a:solidFill>
+              </a:rPr>
+              <a:t>wasm</a:t>
+            </a:r>
+            <a:r>
+              <a:rPr lang="en-US" sz="1000" dirty="0">
+                <a:solidFill>
+                  <a:srgbClr val="97A7AF"/>
+                </a:solidFill>
+              </a:rPr>
+              <a:t>)</a:t>
             </a:r>
           </a:p>
         </p:txBody>
@@ -4870,7 +4798,7 @@
                 <a:ea typeface="Source Sans Pro Light" charset="0"/>
                 <a:cs typeface="Source Sans Pro Light" charset="0"/>
               </a:rPr>
-              <a:t>Java Compiler (JDT)</a:t>
+              <a:t>Source Code Compiler</a:t>
             </a:r>
           </a:p>
         </p:txBody>
@@ -4935,7 +4863,7 @@
         <p:spPr>
           <a:xfrm>
             <a:off x="2854974" y="2276684"/>
-            <a:ext cx="564578" cy="246221"/>
+            <a:ext cx="776175" cy="246221"/>
           </a:xfrm>
           <a:prstGeom prst="rect">
             <a:avLst/>
@@ -4957,7 +4885,7 @@
                   <a:srgbClr val="97A7AF"/>
                 </a:solidFill>
               </a:rPr>
-              <a:t>(*.java)</a:t>
+              <a:t>(*.java, *.c)</a:t>
             </a:r>
           </a:p>
         </p:txBody>
@@ -5276,2177 +5204,6 @@
   <p:clrMapOvr>
     <a:masterClrMapping/>
   </p:clrMapOvr>
-</p:sld>
-</file>
-
-<file path=ppt/slides/slide2.xml><?xml version="1.0" encoding="utf-8"?>
-<p:sld xmlns:a="http://schemas.openxmlformats.org/drawingml/2006/main" xmlns:r="http://schemas.openxmlformats.org/officeDocument/2006/relationships" xmlns:p="http://schemas.openxmlformats.org/presentationml/2006/main" showMasterSp="0">
-  <p:cSld>
-    <p:spTree>
-      <p:nvGrpSpPr>
-        <p:cNvPr id="1" name=""/>
-        <p:cNvGrpSpPr/>
-        <p:nvPr/>
-      </p:nvGrpSpPr>
-      <p:grpSpPr>
-        <a:xfrm>
-          <a:off x="0" y="0"/>
-          <a:ext cx="0" cy="0"/>
-          <a:chOff x="0" y="0"/>
-          <a:chExt cx="0" cy="0"/>
-        </a:xfrm>
-      </p:grpSpPr>
-      <p:sp>
-        <p:nvSpPr>
-          <p:cNvPr id="80" name="Rectangle 79">
-            <a:extLst>
-              <a:ext uri="{FF2B5EF4-FFF2-40B4-BE49-F238E27FC236}">
-                <a16:creationId xmlns:a16="http://schemas.microsoft.com/office/drawing/2014/main" id="{216EDCD9-3800-45D9-B054-73E9A88C1E52}"/>
-              </a:ext>
-            </a:extLst>
-          </p:cNvPr>
-          <p:cNvSpPr/>
-          <p:nvPr/>
-        </p:nvSpPr>
-        <p:spPr>
-          <a:xfrm>
-            <a:off x="7035908" y="1080453"/>
-            <a:ext cx="1401895" cy="702093"/>
-          </a:xfrm>
-          <a:prstGeom prst="rect">
-            <a:avLst/>
-          </a:prstGeom>
-          <a:solidFill>
-            <a:srgbClr val="FCB445"/>
-          </a:solidFill>
-          <a:ln w="12700" cap="flat" cmpd="sng" algn="ctr">
-            <a:noFill/>
-            <a:prstDash val="solid"/>
-            <a:miter lim="800000"/>
-          </a:ln>
-          <a:effectLst/>
-        </p:spPr>
-        <p:txBody>
-          <a:bodyPr rtlCol="0" anchor="ctr"/>
-          <a:lstStyle/>
-          <a:p>
-            <a:pPr algn="ctr"/>
-            <a:r>
-              <a:rPr lang="en-US" sz="1200" b="1" dirty="0">
-                <a:solidFill>
-                  <a:schemeClr val="bg1"/>
-                </a:solidFill>
-                <a:cs typeface="Arial" panose="020B0604020202020204" pitchFamily="34" charset="0"/>
-              </a:rPr>
-              <a:t>JS Application </a:t>
-            </a:r>
-          </a:p>
-          <a:p>
-            <a:pPr algn="ctr"/>
-            <a:r>
-              <a:rPr lang="en-US" sz="1200" b="1" dirty="0">
-                <a:solidFill>
-                  <a:schemeClr val="bg1"/>
-                </a:solidFill>
-                <a:cs typeface="Arial" panose="020B0604020202020204" pitchFamily="34" charset="0"/>
-              </a:rPr>
-              <a:t>+ Libraries</a:t>
-            </a:r>
-            <a:endParaRPr lang="en-US" sz="1200" dirty="0">
-              <a:solidFill>
-                <a:schemeClr val="bg1"/>
-              </a:solidFill>
-              <a:cs typeface="Arial" panose="020B0604020202020204" pitchFamily="34" charset="0"/>
-            </a:endParaRPr>
-          </a:p>
-        </p:txBody>
-      </p:sp>
-      <p:sp>
-        <p:nvSpPr>
-          <p:cNvPr id="83" name="TextBox 82">
-            <a:extLst>
-              <a:ext uri="{FF2B5EF4-FFF2-40B4-BE49-F238E27FC236}">
-                <a16:creationId xmlns:a16="http://schemas.microsoft.com/office/drawing/2014/main" id="{B6653107-EADE-40C5-80C5-04A320721D3B}"/>
-              </a:ext>
-            </a:extLst>
-          </p:cNvPr>
-          <p:cNvSpPr txBox="1"/>
-          <p:nvPr/>
-        </p:nvSpPr>
-        <p:spPr>
-          <a:xfrm>
-            <a:off x="7412678" y="4080035"/>
-            <a:ext cx="4299946" cy="400110"/>
-          </a:xfrm>
-          <a:prstGeom prst="rect">
-            <a:avLst/>
-          </a:prstGeom>
-          <a:noFill/>
-        </p:spPr>
-        <p:txBody>
-          <a:bodyPr wrap="square" rtlCol="0">
-            <a:spAutoFit/>
-          </a:bodyPr>
-          <a:lstStyle/>
-          <a:p>
-            <a:r>
-              <a:rPr lang="en-US" sz="2000" b="1" dirty="0">
-                <a:solidFill>
-                  <a:schemeClr val="accent1"/>
-                </a:solidFill>
-              </a:rPr>
-              <a:t>Common Language Infrastructure </a:t>
-            </a:r>
-            <a:r>
-              <a:rPr lang="en-US" sz="1200" b="1" dirty="0">
-                <a:solidFill>
-                  <a:schemeClr val="accent1"/>
-                </a:solidFill>
-              </a:rPr>
-              <a:t>(J2VM ISA)</a:t>
-            </a:r>
-          </a:p>
-        </p:txBody>
-      </p:sp>
-      <p:pic>
-        <p:nvPicPr>
-          <p:cNvPr id="14" name="Picture 13">
-            <a:extLst>
-              <a:ext uri="{FF2B5EF4-FFF2-40B4-BE49-F238E27FC236}">
-                <a16:creationId xmlns:a16="http://schemas.microsoft.com/office/drawing/2014/main" id="{25BF4613-3E9E-40AC-888F-B92A6B8C0085}"/>
-              </a:ext>
-            </a:extLst>
-          </p:cNvPr>
-          <p:cNvPicPr>
-            <a:picLocks noChangeAspect="1"/>
-          </p:cNvPicPr>
-          <p:nvPr/>
-        </p:nvPicPr>
-        <p:blipFill>
-          <a:blip r:embed="rId3" cstate="print">
-            <a:extLst>
-              <a:ext uri="{28A0092B-C50C-407E-A947-70E740481C1C}">
-                <a14:useLocalDpi xmlns:a14="http://schemas.microsoft.com/office/drawing/2010/main" val="0"/>
-              </a:ext>
-            </a:extLst>
-          </a:blip>
-          <a:stretch>
-            <a:fillRect/>
-          </a:stretch>
-        </p:blipFill>
-        <p:spPr>
-          <a:xfrm>
-            <a:off x="953900" y="1015630"/>
-            <a:ext cx="1812810" cy="987982"/>
-          </a:xfrm>
-          <a:prstGeom prst="rect">
-            <a:avLst/>
-          </a:prstGeom>
-        </p:spPr>
-      </p:pic>
-      <p:sp>
-        <p:nvSpPr>
-          <p:cNvPr id="70" name="Rectangle 69">
-            <a:extLst>
-              <a:ext uri="{FF2B5EF4-FFF2-40B4-BE49-F238E27FC236}">
-                <a16:creationId xmlns:a16="http://schemas.microsoft.com/office/drawing/2014/main" id="{3AF841B0-5EA7-471D-9E57-578809D82DBA}"/>
-              </a:ext>
-            </a:extLst>
-          </p:cNvPr>
-          <p:cNvSpPr/>
-          <p:nvPr/>
-        </p:nvSpPr>
-        <p:spPr>
-          <a:xfrm>
-            <a:off x="5276337" y="1080500"/>
-            <a:ext cx="1460132" cy="702093"/>
-          </a:xfrm>
-          <a:prstGeom prst="rect">
-            <a:avLst/>
-          </a:prstGeom>
-          <a:solidFill>
-            <a:srgbClr val="FCB445"/>
-          </a:solidFill>
-          <a:ln w="12700" cap="flat" cmpd="sng" algn="ctr">
-            <a:noFill/>
-            <a:prstDash val="solid"/>
-            <a:miter lim="800000"/>
-          </a:ln>
-          <a:effectLst/>
-        </p:spPr>
-        <p:txBody>
-          <a:bodyPr rtlCol="0" anchor="ctr"/>
-          <a:lstStyle/>
-          <a:p>
-            <a:pPr algn="ctr"/>
-            <a:r>
-              <a:rPr lang="en-US" sz="1200" b="1" dirty="0">
-                <a:solidFill>
-                  <a:schemeClr val="bg1"/>
-                </a:solidFill>
-                <a:cs typeface="Arial" panose="020B0604020202020204" pitchFamily="34" charset="0"/>
-              </a:rPr>
-              <a:t>Java Application </a:t>
-            </a:r>
-          </a:p>
-          <a:p>
-            <a:pPr algn="ctr"/>
-            <a:r>
-              <a:rPr lang="en-US" sz="1200" b="1" dirty="0">
-                <a:solidFill>
-                  <a:schemeClr val="bg1"/>
-                </a:solidFill>
-                <a:cs typeface="Arial" panose="020B0604020202020204" pitchFamily="34" charset="0"/>
-              </a:rPr>
-              <a:t>+ Libraries</a:t>
-            </a:r>
-            <a:endParaRPr lang="en-US" sz="1200" dirty="0">
-              <a:solidFill>
-                <a:schemeClr val="bg1"/>
-              </a:solidFill>
-              <a:cs typeface="Arial" panose="020B0604020202020204" pitchFamily="34" charset="0"/>
-            </a:endParaRPr>
-          </a:p>
-        </p:txBody>
-      </p:sp>
-      <p:sp>
-        <p:nvSpPr>
-          <p:cNvPr id="68" name="Rectangle 67">
-            <a:extLst>
-              <a:ext uri="{FF2B5EF4-FFF2-40B4-BE49-F238E27FC236}">
-                <a16:creationId xmlns:a16="http://schemas.microsoft.com/office/drawing/2014/main" id="{5AB708F0-2228-49A3-984F-49600C35AEA5}"/>
-              </a:ext>
-            </a:extLst>
-          </p:cNvPr>
-          <p:cNvSpPr/>
-          <p:nvPr/>
-        </p:nvSpPr>
-        <p:spPr>
-          <a:xfrm>
-            <a:off x="3415855" y="1078257"/>
-            <a:ext cx="1472928" cy="708454"/>
-          </a:xfrm>
-          <a:prstGeom prst="rect">
-            <a:avLst/>
-          </a:prstGeom>
-          <a:solidFill>
-            <a:srgbClr val="FCB445"/>
-          </a:solidFill>
-          <a:ln w="12700" cap="flat" cmpd="sng" algn="ctr">
-            <a:noFill/>
-            <a:prstDash val="solid"/>
-            <a:miter lim="800000"/>
-          </a:ln>
-          <a:effectLst/>
-        </p:spPr>
-        <p:txBody>
-          <a:bodyPr rtlCol="0" anchor="ctr"/>
-          <a:lstStyle/>
-          <a:p>
-            <a:pPr algn="ctr"/>
-            <a:r>
-              <a:rPr lang="en-US" sz="1200" b="1" dirty="0">
-                <a:solidFill>
-                  <a:schemeClr val="bg1"/>
-                </a:solidFill>
-                <a:cs typeface="Arial" panose="020B0604020202020204" pitchFamily="34" charset="0"/>
-              </a:rPr>
-              <a:t> C Code</a:t>
-            </a:r>
-          </a:p>
-          <a:p>
-            <a:pPr algn="ctr"/>
-            <a:r>
-              <a:rPr lang="en-US" sz="1200" b="1" dirty="0">
-                <a:solidFill>
-                  <a:schemeClr val="bg1"/>
-                </a:solidFill>
-                <a:cs typeface="Arial" panose="020B0604020202020204" pitchFamily="34" charset="0"/>
-              </a:rPr>
-              <a:t>BSP drivers</a:t>
-            </a:r>
-          </a:p>
-          <a:p>
-            <a:pPr algn="ctr"/>
-            <a:r>
-              <a:rPr lang="en-US" sz="1200" b="1" dirty="0">
-                <a:solidFill>
-                  <a:schemeClr val="bg1"/>
-                </a:solidFill>
-                <a:cs typeface="Arial" panose="020B0604020202020204" pitchFamily="34" charset="0"/>
-              </a:rPr>
-              <a:t>+ libraries</a:t>
-            </a:r>
-          </a:p>
-        </p:txBody>
-      </p:sp>
-      <p:cxnSp>
-        <p:nvCxnSpPr>
-          <p:cNvPr id="112" name="Connecteur droit avec flèche 9"/>
-          <p:cNvCxnSpPr/>
-          <p:nvPr/>
-        </p:nvCxnSpPr>
-        <p:spPr>
-          <a:xfrm>
-            <a:off x="3733415" y="1786401"/>
-            <a:ext cx="0" cy="360040"/>
-          </a:xfrm>
-          <a:prstGeom prst="straightConnector1">
-            <a:avLst/>
-          </a:prstGeom>
-          <a:ln>
-            <a:solidFill>
-              <a:schemeClr val="tx2"/>
-            </a:solidFill>
-            <a:tailEnd type="triangle"/>
-          </a:ln>
-        </p:spPr>
-        <p:style>
-          <a:lnRef idx="1">
-            <a:schemeClr val="accent1"/>
-          </a:lnRef>
-          <a:fillRef idx="0">
-            <a:schemeClr val="accent1"/>
-          </a:fillRef>
-          <a:effectRef idx="0">
-            <a:schemeClr val="accent1"/>
-          </a:effectRef>
-          <a:fontRef idx="minor">
-            <a:schemeClr val="tx1"/>
-          </a:fontRef>
-        </p:style>
-      </p:cxnSp>
-      <p:cxnSp>
-        <p:nvCxnSpPr>
-          <p:cNvPr id="118" name="Connecteur droit avec flèche 151"/>
-          <p:cNvCxnSpPr/>
-          <p:nvPr/>
-        </p:nvCxnSpPr>
-        <p:spPr>
-          <a:xfrm>
-            <a:off x="5800587" y="1774910"/>
-            <a:ext cx="0" cy="374321"/>
-          </a:xfrm>
-          <a:prstGeom prst="straightConnector1">
-            <a:avLst/>
-          </a:prstGeom>
-          <a:ln>
-            <a:solidFill>
-              <a:schemeClr val="tx2"/>
-            </a:solidFill>
-            <a:tailEnd type="triangle"/>
-          </a:ln>
-        </p:spPr>
-        <p:style>
-          <a:lnRef idx="1">
-            <a:schemeClr val="accent1"/>
-          </a:lnRef>
-          <a:fillRef idx="0">
-            <a:schemeClr val="accent1"/>
-          </a:fillRef>
-          <a:effectRef idx="0">
-            <a:schemeClr val="accent1"/>
-          </a:effectRef>
-          <a:fontRef idx="minor">
-            <a:schemeClr val="tx1"/>
-          </a:fontRef>
-        </p:style>
-      </p:cxnSp>
-      <p:sp>
-        <p:nvSpPr>
-          <p:cNvPr id="121" name="Flèche vers le bas 154"/>
-          <p:cNvSpPr/>
-          <p:nvPr/>
-        </p:nvSpPr>
-        <p:spPr>
-          <a:xfrm>
-            <a:off x="7310156" y="4720182"/>
-            <a:ext cx="192213" cy="617226"/>
-          </a:xfrm>
-          <a:prstGeom prst="downArrow">
-            <a:avLst/>
-          </a:prstGeom>
-          <a:solidFill>
-            <a:schemeClr val="bg2">
-              <a:lumMod val="50000"/>
-            </a:schemeClr>
-          </a:solidFill>
-          <a:ln>
-            <a:noFill/>
-          </a:ln>
-          <a:effectLst/>
-        </p:spPr>
-        <p:style>
-          <a:lnRef idx="2">
-            <a:schemeClr val="dk1">
-              <a:shade val="50000"/>
-            </a:schemeClr>
-          </a:lnRef>
-          <a:fillRef idx="1">
-            <a:schemeClr val="dk1"/>
-          </a:fillRef>
-          <a:effectRef idx="0">
-            <a:schemeClr val="dk1"/>
-          </a:effectRef>
-          <a:fontRef idx="minor">
-            <a:schemeClr val="lt1"/>
-          </a:fontRef>
-        </p:style>
-        <p:txBody>
-          <a:bodyPr rtlCol="0" anchor="ctr"/>
-          <a:lstStyle/>
-          <a:p>
-            <a:pPr algn="ctr"/>
-            <a:endParaRPr lang="en-US" sz="1000" b="1" dirty="0">
-              <a:solidFill>
-                <a:schemeClr val="bg1"/>
-              </a:solidFill>
-              <a:cs typeface="Arial" panose="020B0604020202020204" pitchFamily="34" charset="0"/>
-            </a:endParaRPr>
-          </a:p>
-        </p:txBody>
-      </p:sp>
-      <p:sp>
-        <p:nvSpPr>
-          <p:cNvPr id="122" name="Rectangle 121"/>
-          <p:cNvSpPr/>
-          <p:nvPr/>
-        </p:nvSpPr>
-        <p:spPr>
-          <a:xfrm>
-            <a:off x="4510391" y="6401369"/>
-            <a:ext cx="2162638" cy="153615"/>
-          </a:xfrm>
-          <a:prstGeom prst="rect">
-            <a:avLst/>
-          </a:prstGeom>
-          <a:solidFill>
-            <a:schemeClr val="accent1"/>
-          </a:solidFill>
-          <a:ln>
-            <a:noFill/>
-          </a:ln>
-          <a:effectLst/>
-        </p:spPr>
-        <p:style>
-          <a:lnRef idx="2">
-            <a:schemeClr val="dk1">
-              <a:shade val="50000"/>
-            </a:schemeClr>
-          </a:lnRef>
-          <a:fillRef idx="1">
-            <a:schemeClr val="dk1"/>
-          </a:fillRef>
-          <a:effectRef idx="0">
-            <a:schemeClr val="dk1"/>
-          </a:effectRef>
-          <a:fontRef idx="minor">
-            <a:schemeClr val="lt1"/>
-          </a:fontRef>
-        </p:style>
-        <p:txBody>
-          <a:bodyPr rtlCol="0" anchor="ctr"/>
-          <a:lstStyle/>
-          <a:p>
-            <a:pPr algn="ctr"/>
-            <a:r>
-              <a:rPr lang="en-US" sz="1000" b="1" dirty="0">
-                <a:solidFill>
-                  <a:schemeClr val="bg1"/>
-                </a:solidFill>
-                <a:cs typeface="Arial" panose="020B0604020202020204" pitchFamily="34" charset="0"/>
-              </a:rPr>
-              <a:t>MicroEJ MEJ32</a:t>
-            </a:r>
-          </a:p>
-        </p:txBody>
-      </p:sp>
-      <p:sp>
-        <p:nvSpPr>
-          <p:cNvPr id="123" name="Rectangle 122"/>
-          <p:cNvSpPr/>
-          <p:nvPr/>
-        </p:nvSpPr>
-        <p:spPr>
-          <a:xfrm>
-            <a:off x="4510391" y="5978876"/>
-            <a:ext cx="2162639" cy="432218"/>
-          </a:xfrm>
-          <a:prstGeom prst="rect">
-            <a:avLst/>
-          </a:prstGeom>
-          <a:solidFill>
-            <a:srgbClr val="FCB445"/>
-          </a:solidFill>
-          <a:ln w="12700" cap="flat" cmpd="sng" algn="ctr">
-            <a:noFill/>
-            <a:prstDash val="solid"/>
-            <a:miter lim="800000"/>
-          </a:ln>
-          <a:effectLst/>
-        </p:spPr>
-        <p:txBody>
-          <a:bodyPr rtlCol="0" anchor="ctr"/>
-          <a:lstStyle/>
-          <a:p>
-            <a:pPr algn="ctr"/>
-            <a:r>
-              <a:rPr lang="en-US" sz="1200" b="1" dirty="0">
-                <a:solidFill>
-                  <a:schemeClr val="bg1"/>
-                </a:solidFill>
-                <a:cs typeface="Arial" panose="020B0604020202020204" pitchFamily="34" charset="0"/>
-              </a:rPr>
-              <a:t>Application + Libraries</a:t>
-            </a:r>
-          </a:p>
-        </p:txBody>
-      </p:sp>
-      <p:sp>
-        <p:nvSpPr>
-          <p:cNvPr id="124" name="Rectangle 123"/>
-          <p:cNvSpPr/>
-          <p:nvPr/>
-        </p:nvSpPr>
-        <p:spPr>
-          <a:xfrm>
-            <a:off x="4510390" y="6553759"/>
-            <a:ext cx="2162639" cy="172197"/>
-          </a:xfrm>
-          <a:prstGeom prst="rect">
-            <a:avLst/>
-          </a:prstGeom>
-          <a:solidFill>
-            <a:srgbClr val="FCB445"/>
-          </a:solidFill>
-          <a:ln w="12700" cap="flat" cmpd="sng" algn="ctr">
-            <a:noFill/>
-            <a:prstDash val="solid"/>
-            <a:miter lim="800000"/>
-          </a:ln>
-          <a:effectLst/>
-        </p:spPr>
-        <p:txBody>
-          <a:bodyPr rtlCol="0" anchor="ctr"/>
-          <a:lstStyle/>
-          <a:p>
-            <a:pPr algn="ctr"/>
-            <a:r>
-              <a:rPr lang="en-US" sz="1200" b="1" dirty="0">
-                <a:solidFill>
-                  <a:schemeClr val="bg1"/>
-                </a:solidFill>
-                <a:cs typeface="Arial" panose="020B0604020202020204" pitchFamily="34" charset="0"/>
-              </a:rPr>
-              <a:t>BSP</a:t>
-            </a:r>
-          </a:p>
-        </p:txBody>
-      </p:sp>
-      <p:sp>
-        <p:nvSpPr>
-          <p:cNvPr id="128" name="ZoneTexte 164"/>
-          <p:cNvSpPr txBox="1"/>
-          <p:nvPr/>
-        </p:nvSpPr>
-        <p:spPr>
-          <a:xfrm>
-            <a:off x="3155331" y="6078629"/>
-            <a:ext cx="1287532" cy="415498"/>
-          </a:xfrm>
-          <a:prstGeom prst="rect">
-            <a:avLst/>
-          </a:prstGeom>
-          <a:noFill/>
-        </p:spPr>
-        <p:txBody>
-          <a:bodyPr wrap="none" rtlCol="0">
-            <a:spAutoFit/>
-          </a:bodyPr>
-          <a:lstStyle/>
-          <a:p>
-            <a:r>
-              <a:rPr lang="en-US" sz="1050" dirty="0"/>
-              <a:t>Powered by MicroEJ</a:t>
-            </a:r>
-            <a:br>
-              <a:rPr lang="en-US" sz="1050" dirty="0"/>
-            </a:br>
-            <a:r>
-              <a:rPr lang="en-US" sz="1050" dirty="0"/>
-              <a:t>monolithic firmware</a:t>
-            </a:r>
-          </a:p>
-        </p:txBody>
-      </p:sp>
-      <p:cxnSp>
-        <p:nvCxnSpPr>
-          <p:cNvPr id="129" name="Connecteur droit 165"/>
-          <p:cNvCxnSpPr/>
-          <p:nvPr/>
-        </p:nvCxnSpPr>
-        <p:spPr>
-          <a:xfrm flipH="1">
-            <a:off x="4448657" y="5862765"/>
-            <a:ext cx="1" cy="863190"/>
-          </a:xfrm>
-          <a:prstGeom prst="line">
-            <a:avLst/>
-          </a:prstGeom>
-          <a:ln w="12700">
-            <a:solidFill>
-              <a:schemeClr val="tx1">
-                <a:lumMod val="60000"/>
-                <a:lumOff val="40000"/>
-              </a:schemeClr>
-            </a:solidFill>
-          </a:ln>
-        </p:spPr>
-        <p:style>
-          <a:lnRef idx="1">
-            <a:schemeClr val="accent1"/>
-          </a:lnRef>
-          <a:fillRef idx="0">
-            <a:schemeClr val="accent1"/>
-          </a:fillRef>
-          <a:effectRef idx="0">
-            <a:schemeClr val="accent1"/>
-          </a:effectRef>
-          <a:fontRef idx="minor">
-            <a:schemeClr val="tx1"/>
-          </a:fontRef>
-        </p:style>
-      </p:cxnSp>
-      <p:sp>
-        <p:nvSpPr>
-          <p:cNvPr id="130" name="Flèche vers le bas 166"/>
-          <p:cNvSpPr/>
-          <p:nvPr/>
-        </p:nvSpPr>
-        <p:spPr>
-          <a:xfrm>
-            <a:off x="3645463" y="2344093"/>
-            <a:ext cx="232899" cy="2933440"/>
-          </a:xfrm>
-          <a:prstGeom prst="downArrow">
-            <a:avLst/>
-          </a:prstGeom>
-          <a:solidFill>
-            <a:schemeClr val="bg2">
-              <a:lumMod val="50000"/>
-            </a:schemeClr>
-          </a:solidFill>
-          <a:ln>
-            <a:noFill/>
-          </a:ln>
-          <a:effectLst/>
-        </p:spPr>
-        <p:style>
-          <a:lnRef idx="2">
-            <a:schemeClr val="dk1">
-              <a:shade val="50000"/>
-            </a:schemeClr>
-          </a:lnRef>
-          <a:fillRef idx="1">
-            <a:schemeClr val="dk1"/>
-          </a:fillRef>
-          <a:effectRef idx="0">
-            <a:schemeClr val="dk1"/>
-          </a:effectRef>
-          <a:fontRef idx="minor">
-            <a:schemeClr val="lt1"/>
-          </a:fontRef>
-        </p:style>
-        <p:txBody>
-          <a:bodyPr rtlCol="0" anchor="ctr"/>
-          <a:lstStyle/>
-          <a:p>
-            <a:pPr algn="ctr"/>
-            <a:endParaRPr lang="en-US" sz="1000" b="1" dirty="0">
-              <a:solidFill>
-                <a:schemeClr val="bg1"/>
-              </a:solidFill>
-              <a:cs typeface="Arial" panose="020B0604020202020204" pitchFamily="34" charset="0"/>
-            </a:endParaRPr>
-          </a:p>
-        </p:txBody>
-      </p:sp>
-      <p:sp>
-        <p:nvSpPr>
-          <p:cNvPr id="131" name="Rectangle 130"/>
-          <p:cNvSpPr/>
-          <p:nvPr/>
-        </p:nvSpPr>
-        <p:spPr>
-          <a:xfrm>
-            <a:off x="3411590" y="2148259"/>
-            <a:ext cx="1472927" cy="351474"/>
-          </a:xfrm>
-          <a:prstGeom prst="rect">
-            <a:avLst/>
-          </a:prstGeom>
-          <a:solidFill>
-            <a:schemeClr val="bg2">
-              <a:lumMod val="50000"/>
-            </a:schemeClr>
-          </a:solidFill>
-          <a:ln>
-            <a:noFill/>
-          </a:ln>
-          <a:effectLst/>
-        </p:spPr>
-        <p:style>
-          <a:lnRef idx="2">
-            <a:schemeClr val="dk1">
-              <a:shade val="50000"/>
-            </a:schemeClr>
-          </a:lnRef>
-          <a:fillRef idx="1">
-            <a:schemeClr val="dk1"/>
-          </a:fillRef>
-          <a:effectRef idx="0">
-            <a:schemeClr val="dk1"/>
-          </a:effectRef>
-          <a:fontRef idx="minor">
-            <a:schemeClr val="lt1"/>
-          </a:fontRef>
-        </p:style>
-        <p:txBody>
-          <a:bodyPr rtlCol="0" anchor="ctr"/>
-          <a:lstStyle/>
-          <a:p>
-            <a:pPr algn="ctr"/>
-            <a:r>
-              <a:rPr lang="en-US" sz="1000" b="1" dirty="0">
-                <a:solidFill>
-                  <a:schemeClr val="bg1"/>
-                </a:solidFill>
-                <a:cs typeface="Arial" panose="020B0604020202020204" pitchFamily="34" charset="0"/>
-              </a:rPr>
-              <a:t>C Compiler</a:t>
-            </a:r>
-          </a:p>
-        </p:txBody>
-      </p:sp>
-      <p:sp>
-        <p:nvSpPr>
-          <p:cNvPr id="133" name="Rectangle 132"/>
-          <p:cNvSpPr/>
-          <p:nvPr/>
-        </p:nvSpPr>
-        <p:spPr>
-          <a:xfrm>
-            <a:off x="5265017" y="2143763"/>
-            <a:ext cx="1483572" cy="355970"/>
-          </a:xfrm>
-          <a:prstGeom prst="rect">
-            <a:avLst/>
-          </a:prstGeom>
-          <a:solidFill>
-            <a:schemeClr val="bg2">
-              <a:lumMod val="50000"/>
-            </a:schemeClr>
-          </a:solidFill>
-          <a:ln>
-            <a:noFill/>
-          </a:ln>
-          <a:effectLst/>
-        </p:spPr>
-        <p:style>
-          <a:lnRef idx="2">
-            <a:schemeClr val="dk1">
-              <a:shade val="50000"/>
-            </a:schemeClr>
-          </a:lnRef>
-          <a:fillRef idx="1">
-            <a:schemeClr val="dk1"/>
-          </a:fillRef>
-          <a:effectRef idx="0">
-            <a:schemeClr val="dk1"/>
-          </a:effectRef>
-          <a:fontRef idx="minor">
-            <a:schemeClr val="lt1"/>
-          </a:fontRef>
-        </p:style>
-        <p:txBody>
-          <a:bodyPr rtlCol="0" anchor="ctr"/>
-          <a:lstStyle/>
-          <a:p>
-            <a:pPr algn="ctr"/>
-            <a:r>
-              <a:rPr lang="en-US" sz="1000" b="1" dirty="0">
-                <a:solidFill>
-                  <a:schemeClr val="bg1"/>
-                </a:solidFill>
-                <a:cs typeface="Arial" panose="020B0604020202020204" pitchFamily="34" charset="0"/>
-              </a:rPr>
-              <a:t>Java Compiler</a:t>
-            </a:r>
-          </a:p>
-        </p:txBody>
-      </p:sp>
-      <p:sp>
-        <p:nvSpPr>
-          <p:cNvPr id="134" name="Flèche vers le bas 172"/>
-          <p:cNvSpPr/>
-          <p:nvPr/>
-        </p:nvSpPr>
-        <p:spPr>
-          <a:xfrm rot="19128435">
-            <a:off x="6174550" y="2614058"/>
-            <a:ext cx="202333" cy="2023380"/>
-          </a:xfrm>
-          <a:prstGeom prst="downArrow">
-            <a:avLst/>
-          </a:prstGeom>
-          <a:solidFill>
-            <a:schemeClr val="bg2">
-              <a:lumMod val="50000"/>
-            </a:schemeClr>
-          </a:solidFill>
-          <a:ln>
-            <a:noFill/>
-          </a:ln>
-          <a:effectLst/>
-        </p:spPr>
-        <p:style>
-          <a:lnRef idx="2">
-            <a:schemeClr val="dk1">
-              <a:shade val="50000"/>
-            </a:schemeClr>
-          </a:lnRef>
-          <a:fillRef idx="1">
-            <a:schemeClr val="dk1"/>
-          </a:fillRef>
-          <a:effectRef idx="0">
-            <a:schemeClr val="dk1"/>
-          </a:effectRef>
-          <a:fontRef idx="minor">
-            <a:schemeClr val="lt1"/>
-          </a:fontRef>
-        </p:style>
-        <p:txBody>
-          <a:bodyPr rtlCol="0" anchor="ctr"/>
-          <a:lstStyle/>
-          <a:p>
-            <a:pPr algn="ctr"/>
-            <a:endParaRPr lang="en-US" sz="1000" b="1" dirty="0">
-              <a:solidFill>
-                <a:schemeClr val="bg1"/>
-              </a:solidFill>
-              <a:cs typeface="Arial" panose="020B0604020202020204" pitchFamily="34" charset="0"/>
-            </a:endParaRPr>
-          </a:p>
-        </p:txBody>
-      </p:sp>
-      <p:sp>
-        <p:nvSpPr>
-          <p:cNvPr id="139" name="Bande diagonale 37"/>
-          <p:cNvSpPr/>
-          <p:nvPr/>
-        </p:nvSpPr>
-        <p:spPr>
-          <a:xfrm rot="948540">
-            <a:off x="1576321" y="1066943"/>
-            <a:ext cx="279828" cy="279828"/>
-          </a:xfrm>
-          <a:prstGeom prst="diagStripe">
-            <a:avLst>
-              <a:gd name="adj" fmla="val 41991"/>
-            </a:avLst>
-          </a:prstGeom>
-          <a:solidFill>
-            <a:schemeClr val="accent1">
-              <a:lumMod val="75000"/>
-            </a:schemeClr>
-          </a:solidFill>
-          <a:ln>
-            <a:noFill/>
-          </a:ln>
-        </p:spPr>
-        <p:style>
-          <a:lnRef idx="2">
-            <a:schemeClr val="accent1">
-              <a:shade val="50000"/>
-            </a:schemeClr>
-          </a:lnRef>
-          <a:fillRef idx="1">
-            <a:schemeClr val="accent1"/>
-          </a:fillRef>
-          <a:effectRef idx="0">
-            <a:schemeClr val="accent1"/>
-          </a:effectRef>
-          <a:fontRef idx="minor">
-            <a:schemeClr val="lt1"/>
-          </a:fontRef>
-        </p:style>
-        <p:txBody>
-          <a:bodyPr rtlCol="0" anchor="ctr"/>
-          <a:lstStyle/>
-          <a:p>
-            <a:pPr algn="ctr"/>
-            <a:endParaRPr lang="en-US" dirty="0"/>
-          </a:p>
-        </p:txBody>
-      </p:sp>
-      <p:sp>
-        <p:nvSpPr>
-          <p:cNvPr id="140" name="ZoneTexte 178"/>
-          <p:cNvSpPr txBox="1"/>
-          <p:nvPr/>
-        </p:nvSpPr>
-        <p:spPr>
-          <a:xfrm rot="19702821">
-            <a:off x="1534283" y="1037352"/>
-            <a:ext cx="333746" cy="230832"/>
-          </a:xfrm>
-          <a:prstGeom prst="rect">
-            <a:avLst/>
-          </a:prstGeom>
-          <a:noFill/>
-        </p:spPr>
-        <p:txBody>
-          <a:bodyPr wrap="none" rtlCol="0">
-            <a:spAutoFit/>
-          </a:bodyPr>
-          <a:lstStyle/>
-          <a:p>
-            <a:r>
-              <a:rPr lang="en-US" sz="900" dirty="0">
-                <a:solidFill>
-                  <a:schemeClr val="bg1"/>
-                </a:solidFill>
-              </a:rPr>
-              <a:t>bin</a:t>
-            </a:r>
-            <a:endParaRPr lang="en-US" sz="1000" dirty="0">
-              <a:solidFill>
-                <a:schemeClr val="bg1"/>
-              </a:solidFill>
-            </a:endParaRPr>
-          </a:p>
-        </p:txBody>
-      </p:sp>
-      <p:sp>
-        <p:nvSpPr>
-          <p:cNvPr id="141" name="Bande diagonale 191"/>
-          <p:cNvSpPr/>
-          <p:nvPr/>
-        </p:nvSpPr>
-        <p:spPr>
-          <a:xfrm>
-            <a:off x="3424059" y="1073941"/>
-            <a:ext cx="279828" cy="279828"/>
-          </a:xfrm>
-          <a:prstGeom prst="diagStripe">
-            <a:avLst>
-              <a:gd name="adj" fmla="val 41991"/>
-            </a:avLst>
-          </a:prstGeom>
-          <a:solidFill>
-            <a:schemeClr val="accent2">
-              <a:lumMod val="75000"/>
-            </a:schemeClr>
-          </a:solidFill>
-          <a:ln>
-            <a:noFill/>
-          </a:ln>
-        </p:spPr>
-        <p:style>
-          <a:lnRef idx="2">
-            <a:schemeClr val="accent1">
-              <a:shade val="50000"/>
-            </a:schemeClr>
-          </a:lnRef>
-          <a:fillRef idx="1">
-            <a:schemeClr val="accent1"/>
-          </a:fillRef>
-          <a:effectRef idx="0">
-            <a:schemeClr val="accent1"/>
-          </a:effectRef>
-          <a:fontRef idx="minor">
-            <a:schemeClr val="lt1"/>
-          </a:fontRef>
-        </p:style>
-        <p:txBody>
-          <a:bodyPr rtlCol="0" anchor="ctr"/>
-          <a:lstStyle/>
-          <a:p>
-            <a:pPr algn="ctr"/>
-            <a:endParaRPr lang="en-US" dirty="0"/>
-          </a:p>
-        </p:txBody>
-      </p:sp>
-      <p:sp>
-        <p:nvSpPr>
-          <p:cNvPr id="142" name="ZoneTexte 180"/>
-          <p:cNvSpPr txBox="1"/>
-          <p:nvPr/>
-        </p:nvSpPr>
-        <p:spPr>
-          <a:xfrm rot="18945775">
-            <a:off x="3350696" y="1050454"/>
-            <a:ext cx="317716" cy="230832"/>
-          </a:xfrm>
-          <a:prstGeom prst="rect">
-            <a:avLst/>
-          </a:prstGeom>
-          <a:noFill/>
-        </p:spPr>
-        <p:txBody>
-          <a:bodyPr wrap="none" rtlCol="0">
-            <a:spAutoFit/>
-          </a:bodyPr>
-          <a:lstStyle/>
-          <a:p>
-            <a:r>
-              <a:rPr lang="en-US" sz="900" dirty="0" err="1">
-                <a:solidFill>
-                  <a:schemeClr val="bg1"/>
-                </a:solidFill>
-              </a:rPr>
-              <a:t>src</a:t>
-            </a:r>
-            <a:endParaRPr lang="en-US" sz="900" dirty="0">
-              <a:solidFill>
-                <a:schemeClr val="bg1"/>
-              </a:solidFill>
-            </a:endParaRPr>
-          </a:p>
-        </p:txBody>
-      </p:sp>
-      <p:sp>
-        <p:nvSpPr>
-          <p:cNvPr id="143" name="Bande diagonale 192"/>
-          <p:cNvSpPr/>
-          <p:nvPr/>
-        </p:nvSpPr>
-        <p:spPr>
-          <a:xfrm>
-            <a:off x="5265017" y="1073941"/>
-            <a:ext cx="279828" cy="279828"/>
-          </a:xfrm>
-          <a:prstGeom prst="diagStripe">
-            <a:avLst>
-              <a:gd name="adj" fmla="val 41991"/>
-            </a:avLst>
-          </a:prstGeom>
-          <a:solidFill>
-            <a:schemeClr val="accent5">
-              <a:lumMod val="75000"/>
-            </a:schemeClr>
-          </a:solidFill>
-          <a:ln>
-            <a:noFill/>
-          </a:ln>
-        </p:spPr>
-        <p:style>
-          <a:lnRef idx="2">
-            <a:schemeClr val="accent1">
-              <a:shade val="50000"/>
-            </a:schemeClr>
-          </a:lnRef>
-          <a:fillRef idx="1">
-            <a:schemeClr val="accent1"/>
-          </a:fillRef>
-          <a:effectRef idx="0">
-            <a:schemeClr val="accent1"/>
-          </a:effectRef>
-          <a:fontRef idx="minor">
-            <a:schemeClr val="lt1"/>
-          </a:fontRef>
-        </p:style>
-        <p:txBody>
-          <a:bodyPr rtlCol="0" anchor="ctr"/>
-          <a:lstStyle/>
-          <a:p>
-            <a:pPr algn="ctr"/>
-            <a:endParaRPr lang="en-US" dirty="0"/>
-          </a:p>
-        </p:txBody>
-      </p:sp>
-      <p:sp>
-        <p:nvSpPr>
-          <p:cNvPr id="144" name="ZoneTexte 182"/>
-          <p:cNvSpPr txBox="1"/>
-          <p:nvPr/>
-        </p:nvSpPr>
-        <p:spPr>
-          <a:xfrm rot="18945775">
-            <a:off x="5192638" y="1045329"/>
-            <a:ext cx="317716" cy="230832"/>
-          </a:xfrm>
-          <a:prstGeom prst="rect">
-            <a:avLst/>
-          </a:prstGeom>
-          <a:noFill/>
-        </p:spPr>
-        <p:txBody>
-          <a:bodyPr wrap="none" rtlCol="0">
-            <a:spAutoFit/>
-          </a:bodyPr>
-          <a:lstStyle/>
-          <a:p>
-            <a:r>
-              <a:rPr lang="en-US" sz="900" dirty="0" err="1">
-                <a:solidFill>
-                  <a:schemeClr val="bg1"/>
-                </a:solidFill>
-              </a:rPr>
-              <a:t>src</a:t>
-            </a:r>
-            <a:endParaRPr lang="en-US" sz="900" dirty="0">
-              <a:solidFill>
-                <a:schemeClr val="bg1"/>
-              </a:solidFill>
-            </a:endParaRPr>
-          </a:p>
-        </p:txBody>
-      </p:sp>
-      <p:sp>
-        <p:nvSpPr>
-          <p:cNvPr id="151" name="Bande diagonale 199"/>
-          <p:cNvSpPr/>
-          <p:nvPr/>
-        </p:nvSpPr>
-        <p:spPr>
-          <a:xfrm>
-            <a:off x="4512929" y="5975862"/>
-            <a:ext cx="279828" cy="279828"/>
-          </a:xfrm>
-          <a:prstGeom prst="diagStripe">
-            <a:avLst>
-              <a:gd name="adj" fmla="val 41991"/>
-            </a:avLst>
-          </a:prstGeom>
-          <a:solidFill>
-            <a:schemeClr val="tx1">
-              <a:lumMod val="60000"/>
-              <a:lumOff val="40000"/>
-            </a:schemeClr>
-          </a:solidFill>
-          <a:ln>
-            <a:noFill/>
-          </a:ln>
-        </p:spPr>
-        <p:style>
-          <a:lnRef idx="2">
-            <a:schemeClr val="accent1">
-              <a:shade val="50000"/>
-            </a:schemeClr>
-          </a:lnRef>
-          <a:fillRef idx="1">
-            <a:schemeClr val="accent1"/>
-          </a:fillRef>
-          <a:effectRef idx="0">
-            <a:schemeClr val="accent1"/>
-          </a:effectRef>
-          <a:fontRef idx="minor">
-            <a:schemeClr val="lt1"/>
-          </a:fontRef>
-        </p:style>
-        <p:txBody>
-          <a:bodyPr rtlCol="0" anchor="ctr"/>
-          <a:lstStyle/>
-          <a:p>
-            <a:pPr algn="ctr"/>
-            <a:endParaRPr lang="en-US" dirty="0"/>
-          </a:p>
-        </p:txBody>
-      </p:sp>
-      <p:sp>
-        <p:nvSpPr>
-          <p:cNvPr id="152" name="ZoneTexte 200"/>
-          <p:cNvSpPr txBox="1"/>
-          <p:nvPr/>
-        </p:nvSpPr>
-        <p:spPr>
-          <a:xfrm rot="18945775">
-            <a:off x="4448006" y="5952555"/>
-            <a:ext cx="333746" cy="230832"/>
-          </a:xfrm>
-          <a:prstGeom prst="rect">
-            <a:avLst/>
-          </a:prstGeom>
-          <a:noFill/>
-        </p:spPr>
-        <p:txBody>
-          <a:bodyPr wrap="none" rtlCol="0">
-            <a:spAutoFit/>
-          </a:bodyPr>
-          <a:lstStyle/>
-          <a:p>
-            <a:r>
-              <a:rPr lang="en-US" sz="900" dirty="0">
-                <a:solidFill>
-                  <a:schemeClr val="bg1"/>
-                </a:solidFill>
-              </a:rPr>
-              <a:t>bin</a:t>
-            </a:r>
-          </a:p>
-        </p:txBody>
-      </p:sp>
-      <p:sp>
-        <p:nvSpPr>
-          <p:cNvPr id="61" name="Rectangle 60">
-            <a:extLst>
-              <a:ext uri="{FF2B5EF4-FFF2-40B4-BE49-F238E27FC236}">
-                <a16:creationId xmlns:a16="http://schemas.microsoft.com/office/drawing/2014/main" id="{8390233C-2EC6-45E8-8FAD-99A238D783B5}"/>
-              </a:ext>
-            </a:extLst>
-          </p:cNvPr>
-          <p:cNvSpPr/>
-          <p:nvPr/>
-        </p:nvSpPr>
-        <p:spPr>
-          <a:xfrm>
-            <a:off x="1631507" y="5302849"/>
-            <a:ext cx="6906962" cy="430407"/>
-          </a:xfrm>
-          <a:prstGeom prst="rect">
-            <a:avLst/>
-          </a:prstGeom>
-          <a:solidFill>
-            <a:schemeClr val="bg2">
-              <a:lumMod val="50000"/>
-            </a:schemeClr>
-          </a:solidFill>
-          <a:ln>
-            <a:noFill/>
-          </a:ln>
-          <a:effectLst/>
-        </p:spPr>
-        <p:style>
-          <a:lnRef idx="2">
-            <a:schemeClr val="dk1">
-              <a:shade val="50000"/>
-            </a:schemeClr>
-          </a:lnRef>
-          <a:fillRef idx="1">
-            <a:schemeClr val="dk1"/>
-          </a:fillRef>
-          <a:effectRef idx="0">
-            <a:schemeClr val="dk1"/>
-          </a:effectRef>
-          <a:fontRef idx="minor">
-            <a:schemeClr val="lt1"/>
-          </a:fontRef>
-        </p:style>
-        <p:txBody>
-          <a:bodyPr rtlCol="0" anchor="ctr"/>
-          <a:lstStyle/>
-          <a:p>
-            <a:pPr algn="ctr"/>
-            <a:r>
-              <a:rPr lang="en-US" sz="1000" b="1" dirty="0">
-                <a:solidFill>
-                  <a:schemeClr val="bg1"/>
-                </a:solidFill>
-                <a:cs typeface="Arial" panose="020B0604020202020204" pitchFamily="34" charset="0"/>
-              </a:rPr>
-              <a:t>ELF Linker</a:t>
-            </a:r>
-          </a:p>
-        </p:txBody>
-      </p:sp>
-      <p:sp>
-        <p:nvSpPr>
-          <p:cNvPr id="62" name="Flèche vers le bas 154">
-            <a:extLst>
-              <a:ext uri="{FF2B5EF4-FFF2-40B4-BE49-F238E27FC236}">
-                <a16:creationId xmlns:a16="http://schemas.microsoft.com/office/drawing/2014/main" id="{8AFA12E6-B8E5-44E1-B806-88C8AFB9E98A}"/>
-              </a:ext>
-            </a:extLst>
-          </p:cNvPr>
-          <p:cNvSpPr/>
-          <p:nvPr/>
-        </p:nvSpPr>
-        <p:spPr>
-          <a:xfrm>
-            <a:off x="5495602" y="5694816"/>
-            <a:ext cx="192213" cy="280339"/>
-          </a:xfrm>
-          <a:prstGeom prst="downArrow">
-            <a:avLst/>
-          </a:prstGeom>
-          <a:solidFill>
-            <a:schemeClr val="bg2">
-              <a:lumMod val="50000"/>
-            </a:schemeClr>
-          </a:solidFill>
-          <a:ln>
-            <a:noFill/>
-          </a:ln>
-          <a:effectLst/>
-        </p:spPr>
-        <p:style>
-          <a:lnRef idx="2">
-            <a:schemeClr val="dk1">
-              <a:shade val="50000"/>
-            </a:schemeClr>
-          </a:lnRef>
-          <a:fillRef idx="1">
-            <a:schemeClr val="dk1"/>
-          </a:fillRef>
-          <a:effectRef idx="0">
-            <a:schemeClr val="dk1"/>
-          </a:effectRef>
-          <a:fontRef idx="minor">
-            <a:schemeClr val="lt1"/>
-          </a:fontRef>
-        </p:style>
-        <p:txBody>
-          <a:bodyPr rtlCol="0" anchor="ctr"/>
-          <a:lstStyle/>
-          <a:p>
-            <a:pPr algn="ctr"/>
-            <a:endParaRPr lang="en-US" sz="1000" b="1" dirty="0">
-              <a:solidFill>
-                <a:schemeClr val="bg1"/>
-              </a:solidFill>
-              <a:cs typeface="Arial" panose="020B0604020202020204" pitchFamily="34" charset="0"/>
-            </a:endParaRPr>
-          </a:p>
-        </p:txBody>
-      </p:sp>
-      <p:sp>
-        <p:nvSpPr>
-          <p:cNvPr id="120" name="Rectangle 119"/>
-          <p:cNvSpPr/>
-          <p:nvPr/>
-        </p:nvSpPr>
-        <p:spPr>
-          <a:xfrm>
-            <a:off x="6456041" y="4510761"/>
-            <a:ext cx="2082432" cy="430407"/>
-          </a:xfrm>
-          <a:prstGeom prst="rect">
-            <a:avLst/>
-          </a:prstGeom>
-          <a:solidFill>
-            <a:schemeClr val="bg2">
-              <a:lumMod val="50000"/>
-            </a:schemeClr>
-          </a:solidFill>
-          <a:ln>
-            <a:noFill/>
-          </a:ln>
-          <a:effectLst/>
-        </p:spPr>
-        <p:style>
-          <a:lnRef idx="2">
-            <a:schemeClr val="dk1">
-              <a:shade val="50000"/>
-            </a:schemeClr>
-          </a:lnRef>
-          <a:fillRef idx="1">
-            <a:schemeClr val="dk1"/>
-          </a:fillRef>
-          <a:effectRef idx="0">
-            <a:schemeClr val="dk1"/>
-          </a:effectRef>
-          <a:fontRef idx="minor">
-            <a:schemeClr val="lt1"/>
-          </a:fontRef>
-        </p:style>
-        <p:txBody>
-          <a:bodyPr rtlCol="0" anchor="ctr"/>
-          <a:lstStyle/>
-          <a:p>
-            <a:pPr algn="ctr"/>
-            <a:r>
-              <a:rPr lang="en-US" sz="1000" b="1" dirty="0">
-                <a:solidFill>
-                  <a:schemeClr val="bg1"/>
-                </a:solidFill>
-                <a:cs typeface="Arial" panose="020B0604020202020204" pitchFamily="34" charset="0"/>
-              </a:rPr>
-              <a:t>MicroEJ SOAR : C.L.I. to MEJ32 ISA</a:t>
-            </a:r>
-          </a:p>
-        </p:txBody>
-      </p:sp>
-      <p:sp>
-        <p:nvSpPr>
-          <p:cNvPr id="71" name="Bande diagonale 192">
-            <a:extLst>
-              <a:ext uri="{FF2B5EF4-FFF2-40B4-BE49-F238E27FC236}">
-                <a16:creationId xmlns:a16="http://schemas.microsoft.com/office/drawing/2014/main" id="{4FAE5C8D-9D35-4D48-A7E5-0C617CB141E4}"/>
-              </a:ext>
-            </a:extLst>
-          </p:cNvPr>
-          <p:cNvSpPr/>
-          <p:nvPr/>
-        </p:nvSpPr>
-        <p:spPr>
-          <a:xfrm>
-            <a:off x="7029540" y="1066944"/>
-            <a:ext cx="279828" cy="279828"/>
-          </a:xfrm>
-          <a:prstGeom prst="diagStripe">
-            <a:avLst>
-              <a:gd name="adj" fmla="val 41991"/>
-            </a:avLst>
-          </a:prstGeom>
-          <a:solidFill>
-            <a:schemeClr val="accent5">
-              <a:lumMod val="75000"/>
-            </a:schemeClr>
-          </a:solidFill>
-          <a:ln>
-            <a:noFill/>
-          </a:ln>
-        </p:spPr>
-        <p:style>
-          <a:lnRef idx="2">
-            <a:schemeClr val="accent1">
-              <a:shade val="50000"/>
-            </a:schemeClr>
-          </a:lnRef>
-          <a:fillRef idx="1">
-            <a:schemeClr val="accent1"/>
-          </a:fillRef>
-          <a:effectRef idx="0">
-            <a:schemeClr val="accent1"/>
-          </a:effectRef>
-          <a:fontRef idx="minor">
-            <a:schemeClr val="lt1"/>
-          </a:fontRef>
-        </p:style>
-        <p:txBody>
-          <a:bodyPr rtlCol="0" anchor="ctr"/>
-          <a:lstStyle/>
-          <a:p>
-            <a:pPr algn="ctr"/>
-            <a:endParaRPr lang="en-US" dirty="0"/>
-          </a:p>
-        </p:txBody>
-      </p:sp>
-      <p:sp>
-        <p:nvSpPr>
-          <p:cNvPr id="72" name="ZoneTexte 182">
-            <a:extLst>
-              <a:ext uri="{FF2B5EF4-FFF2-40B4-BE49-F238E27FC236}">
-                <a16:creationId xmlns:a16="http://schemas.microsoft.com/office/drawing/2014/main" id="{E5C1E506-CD0B-484B-8BBF-1D18AFC3F6A7}"/>
-              </a:ext>
-            </a:extLst>
-          </p:cNvPr>
-          <p:cNvSpPr txBox="1"/>
-          <p:nvPr/>
-        </p:nvSpPr>
-        <p:spPr>
-          <a:xfrm rot="18945775">
-            <a:off x="6957161" y="1038332"/>
-            <a:ext cx="317716" cy="230832"/>
-          </a:xfrm>
-          <a:prstGeom prst="rect">
-            <a:avLst/>
-          </a:prstGeom>
-          <a:noFill/>
-        </p:spPr>
-        <p:txBody>
-          <a:bodyPr wrap="square" rtlCol="0">
-            <a:spAutoFit/>
-          </a:bodyPr>
-          <a:lstStyle/>
-          <a:p>
-            <a:r>
-              <a:rPr lang="en-US" sz="900" dirty="0" err="1">
-                <a:solidFill>
-                  <a:schemeClr val="bg1"/>
-                </a:solidFill>
-              </a:rPr>
-              <a:t>src</a:t>
-            </a:r>
-            <a:endParaRPr lang="en-US" sz="900" dirty="0">
-              <a:solidFill>
-                <a:schemeClr val="bg1"/>
-              </a:solidFill>
-            </a:endParaRPr>
-          </a:p>
-        </p:txBody>
-      </p:sp>
-      <p:sp>
-        <p:nvSpPr>
-          <p:cNvPr id="74" name="Flèche vers le bas 172">
-            <a:extLst>
-              <a:ext uri="{FF2B5EF4-FFF2-40B4-BE49-F238E27FC236}">
-                <a16:creationId xmlns:a16="http://schemas.microsoft.com/office/drawing/2014/main" id="{C1F7088C-52B6-4C45-8C22-4C148C852466}"/>
-              </a:ext>
-            </a:extLst>
-          </p:cNvPr>
-          <p:cNvSpPr/>
-          <p:nvPr/>
-        </p:nvSpPr>
-        <p:spPr>
-          <a:xfrm>
-            <a:off x="7281726" y="2383494"/>
-            <a:ext cx="202333" cy="2008887"/>
-          </a:xfrm>
-          <a:prstGeom prst="downArrow">
-            <a:avLst/>
-          </a:prstGeom>
-          <a:solidFill>
-            <a:schemeClr val="bg2">
-              <a:lumMod val="50000"/>
-            </a:schemeClr>
-          </a:solidFill>
-          <a:ln>
-            <a:noFill/>
-          </a:ln>
-          <a:effectLst/>
-        </p:spPr>
-        <p:style>
-          <a:lnRef idx="2">
-            <a:schemeClr val="dk1">
-              <a:shade val="50000"/>
-            </a:schemeClr>
-          </a:lnRef>
-          <a:fillRef idx="1">
-            <a:schemeClr val="dk1"/>
-          </a:fillRef>
-          <a:effectRef idx="0">
-            <a:schemeClr val="dk1"/>
-          </a:effectRef>
-          <a:fontRef idx="minor">
-            <a:schemeClr val="lt1"/>
-          </a:fontRef>
-        </p:style>
-        <p:txBody>
-          <a:bodyPr rtlCol="0" anchor="ctr"/>
-          <a:lstStyle/>
-          <a:p>
-            <a:pPr algn="ctr"/>
-            <a:endParaRPr lang="en-US" sz="1000" b="1" dirty="0">
-              <a:solidFill>
-                <a:schemeClr val="bg1"/>
-              </a:solidFill>
-              <a:cs typeface="Arial" panose="020B0604020202020204" pitchFamily="34" charset="0"/>
-            </a:endParaRPr>
-          </a:p>
-        </p:txBody>
-      </p:sp>
-      <p:cxnSp>
-        <p:nvCxnSpPr>
-          <p:cNvPr id="75" name="Connecteur droit avec flèche 151">
-            <a:extLst>
-              <a:ext uri="{FF2B5EF4-FFF2-40B4-BE49-F238E27FC236}">
-                <a16:creationId xmlns:a16="http://schemas.microsoft.com/office/drawing/2014/main" id="{F82F1895-1251-4474-B310-3EDA55517D37}"/>
-              </a:ext>
-            </a:extLst>
-          </p:cNvPr>
-          <p:cNvCxnSpPr/>
-          <p:nvPr/>
-        </p:nvCxnSpPr>
-        <p:spPr>
-          <a:xfrm>
-            <a:off x="7382892" y="1762016"/>
-            <a:ext cx="0" cy="374321"/>
-          </a:xfrm>
-          <a:prstGeom prst="straightConnector1">
-            <a:avLst/>
-          </a:prstGeom>
-          <a:ln>
-            <a:solidFill>
-              <a:schemeClr val="tx2"/>
-            </a:solidFill>
-            <a:tailEnd type="triangle"/>
-          </a:ln>
-        </p:spPr>
-        <p:style>
-          <a:lnRef idx="1">
-            <a:schemeClr val="accent1"/>
-          </a:lnRef>
-          <a:fillRef idx="0">
-            <a:schemeClr val="accent1"/>
-          </a:fillRef>
-          <a:effectRef idx="0">
-            <a:schemeClr val="accent1"/>
-          </a:effectRef>
-          <a:fontRef idx="minor">
-            <a:schemeClr val="tx1"/>
-          </a:fontRef>
-        </p:style>
-      </p:cxnSp>
-      <p:sp>
-        <p:nvSpPr>
-          <p:cNvPr id="81" name="Rectangle 80">
-            <a:extLst>
-              <a:ext uri="{FF2B5EF4-FFF2-40B4-BE49-F238E27FC236}">
-                <a16:creationId xmlns:a16="http://schemas.microsoft.com/office/drawing/2014/main" id="{8EF3371B-5840-40C4-93E8-2F38AE82DAB2}"/>
-              </a:ext>
-            </a:extLst>
-          </p:cNvPr>
-          <p:cNvSpPr/>
-          <p:nvPr/>
-        </p:nvSpPr>
-        <p:spPr>
-          <a:xfrm>
-            <a:off x="7034449" y="2141595"/>
-            <a:ext cx="1401750" cy="355970"/>
-          </a:xfrm>
-          <a:prstGeom prst="rect">
-            <a:avLst/>
-          </a:prstGeom>
-          <a:solidFill>
-            <a:schemeClr val="bg2">
-              <a:lumMod val="50000"/>
-            </a:schemeClr>
-          </a:solidFill>
-          <a:ln>
-            <a:noFill/>
-          </a:ln>
-          <a:effectLst/>
-        </p:spPr>
-        <p:style>
-          <a:lnRef idx="2">
-            <a:schemeClr val="dk1">
-              <a:shade val="50000"/>
-            </a:schemeClr>
-          </a:lnRef>
-          <a:fillRef idx="1">
-            <a:schemeClr val="dk1"/>
-          </a:fillRef>
-          <a:effectRef idx="0">
-            <a:schemeClr val="dk1"/>
-          </a:effectRef>
-          <a:fontRef idx="minor">
-            <a:schemeClr val="lt1"/>
-          </a:fontRef>
-        </p:style>
-        <p:txBody>
-          <a:bodyPr rtlCol="0" anchor="ctr"/>
-          <a:lstStyle/>
-          <a:p>
-            <a:pPr algn="ctr"/>
-            <a:r>
-              <a:rPr lang="en-US" sz="1000" b="1" dirty="0">
-                <a:solidFill>
-                  <a:schemeClr val="bg1"/>
-                </a:solidFill>
-                <a:cs typeface="Arial" panose="020B0604020202020204" pitchFamily="34" charset="0"/>
-              </a:rPr>
-              <a:t>JS Compiler</a:t>
-            </a:r>
-          </a:p>
-        </p:txBody>
-      </p:sp>
-      <p:sp>
-        <p:nvSpPr>
-          <p:cNvPr id="4" name="Left Brace 3">
-            <a:extLst>
-              <a:ext uri="{FF2B5EF4-FFF2-40B4-BE49-F238E27FC236}">
-                <a16:creationId xmlns:a16="http://schemas.microsoft.com/office/drawing/2014/main" id="{90C41915-DDDE-46A4-8249-EF30EED9BB7F}"/>
-              </a:ext>
-            </a:extLst>
-          </p:cNvPr>
-          <p:cNvSpPr/>
-          <p:nvPr/>
-        </p:nvSpPr>
-        <p:spPr>
-          <a:xfrm rot="5400000">
-            <a:off x="5777970" y="-1850453"/>
-            <a:ext cx="195479" cy="5120978"/>
-          </a:xfrm>
-          <a:prstGeom prst="leftBrace">
-            <a:avLst>
-              <a:gd name="adj1" fmla="val 8333"/>
-              <a:gd name="adj2" fmla="val 50771"/>
-            </a:avLst>
-          </a:prstGeom>
-        </p:spPr>
-        <p:style>
-          <a:lnRef idx="2">
-            <a:schemeClr val="accent1"/>
-          </a:lnRef>
-          <a:fillRef idx="0">
-            <a:schemeClr val="accent1"/>
-          </a:fillRef>
-          <a:effectRef idx="1">
-            <a:schemeClr val="accent1"/>
-          </a:effectRef>
-          <a:fontRef idx="minor">
-            <a:schemeClr val="tx1"/>
-          </a:fontRef>
-        </p:style>
-        <p:txBody>
-          <a:bodyPr rtlCol="0" anchor="ctr"/>
-          <a:lstStyle/>
-          <a:p>
-            <a:pPr algn="ctr"/>
-            <a:endParaRPr lang="en-US"/>
-          </a:p>
-        </p:txBody>
-      </p:sp>
-      <p:sp>
-        <p:nvSpPr>
-          <p:cNvPr id="5" name="TextBox 4">
-            <a:extLst>
-              <a:ext uri="{FF2B5EF4-FFF2-40B4-BE49-F238E27FC236}">
-                <a16:creationId xmlns:a16="http://schemas.microsoft.com/office/drawing/2014/main" id="{34A40942-91EB-4874-A4C0-F9B5EEF1FE02}"/>
-              </a:ext>
-            </a:extLst>
-          </p:cNvPr>
-          <p:cNvSpPr txBox="1"/>
-          <p:nvPr/>
-        </p:nvSpPr>
-        <p:spPr>
-          <a:xfrm>
-            <a:off x="4603028" y="139290"/>
-            <a:ext cx="2779864" cy="400110"/>
-          </a:xfrm>
-          <a:prstGeom prst="rect">
-            <a:avLst/>
-          </a:prstGeom>
-          <a:noFill/>
-        </p:spPr>
-        <p:txBody>
-          <a:bodyPr wrap="none" rtlCol="0">
-            <a:spAutoFit/>
-          </a:bodyPr>
-          <a:lstStyle/>
-          <a:p>
-            <a:r>
-              <a:rPr lang="en-US" sz="2000" b="1" dirty="0">
-                <a:solidFill>
-                  <a:schemeClr val="accent1"/>
-                </a:solidFill>
-              </a:rPr>
-              <a:t>SUPPORTED LANGUAGES</a:t>
-            </a:r>
-          </a:p>
-        </p:txBody>
-      </p:sp>
-      <p:sp>
-        <p:nvSpPr>
-          <p:cNvPr id="11" name="TextBox 10">
-            <a:extLst>
-              <a:ext uri="{FF2B5EF4-FFF2-40B4-BE49-F238E27FC236}">
-                <a16:creationId xmlns:a16="http://schemas.microsoft.com/office/drawing/2014/main" id="{51BFE25C-A155-4135-B7C1-6E20D2C4E96B}"/>
-              </a:ext>
-            </a:extLst>
-          </p:cNvPr>
-          <p:cNvSpPr txBox="1"/>
-          <p:nvPr/>
-        </p:nvSpPr>
-        <p:spPr>
-          <a:xfrm>
-            <a:off x="8010309" y="4937298"/>
-            <a:ext cx="1401750" cy="400110"/>
-          </a:xfrm>
-          <a:prstGeom prst="rect">
-            <a:avLst/>
-          </a:prstGeom>
-          <a:noFill/>
-        </p:spPr>
-        <p:txBody>
-          <a:bodyPr wrap="square" rtlCol="0">
-            <a:spAutoFit/>
-          </a:bodyPr>
-          <a:lstStyle/>
-          <a:p>
-            <a:r>
-              <a:rPr lang="en-US" sz="2000" b="1" dirty="0">
-                <a:solidFill>
-                  <a:schemeClr val="accent1"/>
-                </a:solidFill>
-              </a:rPr>
-              <a:t>MEJ32 ISA</a:t>
-            </a:r>
-          </a:p>
-        </p:txBody>
-      </p:sp>
-      <p:sp>
-        <p:nvSpPr>
-          <p:cNvPr id="105" name="TextBox 104">
-            <a:extLst>
-              <a:ext uri="{FF2B5EF4-FFF2-40B4-BE49-F238E27FC236}">
-                <a16:creationId xmlns:a16="http://schemas.microsoft.com/office/drawing/2014/main" id="{4649D90A-60AA-48AE-8B3D-F03F4F646CEA}"/>
-              </a:ext>
-            </a:extLst>
-          </p:cNvPr>
-          <p:cNvSpPr txBox="1"/>
-          <p:nvPr/>
-        </p:nvSpPr>
-        <p:spPr>
-          <a:xfrm>
-            <a:off x="7658485" y="5654151"/>
-            <a:ext cx="1401750" cy="400110"/>
-          </a:xfrm>
-          <a:prstGeom prst="rect">
-            <a:avLst/>
-          </a:prstGeom>
-          <a:noFill/>
-        </p:spPr>
-        <p:txBody>
-          <a:bodyPr wrap="square" rtlCol="0">
-            <a:spAutoFit/>
-          </a:bodyPr>
-          <a:lstStyle/>
-          <a:p>
-            <a:pPr algn="r"/>
-            <a:r>
-              <a:rPr lang="en-US" sz="2000" b="1" dirty="0">
-                <a:solidFill>
-                  <a:schemeClr val="accent1"/>
-                </a:solidFill>
-              </a:rPr>
-              <a:t>CPU ISA</a:t>
-            </a:r>
-          </a:p>
-        </p:txBody>
-      </p:sp>
-      <p:sp>
-        <p:nvSpPr>
-          <p:cNvPr id="16" name="TextBox 15">
-            <a:extLst>
-              <a:ext uri="{FF2B5EF4-FFF2-40B4-BE49-F238E27FC236}">
-                <a16:creationId xmlns:a16="http://schemas.microsoft.com/office/drawing/2014/main" id="{D79FB865-3832-4745-AE31-81B82C58EE9F}"/>
-              </a:ext>
-            </a:extLst>
-          </p:cNvPr>
-          <p:cNvSpPr txBox="1"/>
-          <p:nvPr/>
-        </p:nvSpPr>
-        <p:spPr>
-          <a:xfrm>
-            <a:off x="2024245" y="1561961"/>
-            <a:ext cx="865943" cy="400110"/>
-          </a:xfrm>
-          <a:prstGeom prst="rect">
-            <a:avLst/>
-          </a:prstGeom>
-          <a:noFill/>
-          <a:scene3d>
-            <a:camera prst="isometricTopUp"/>
-            <a:lightRig rig="threePt" dir="t"/>
-          </a:scene3d>
-        </p:spPr>
-        <p:txBody>
-          <a:bodyPr wrap="none" rtlCol="0">
-            <a:spAutoFit/>
-          </a:bodyPr>
-          <a:lstStyle/>
-          <a:p>
-            <a:r>
-              <a:rPr lang="en-US" sz="2000" dirty="0">
-                <a:solidFill>
-                  <a:schemeClr val="accent1"/>
-                </a:solidFill>
-              </a:rPr>
-              <a:t>MEJ32</a:t>
-            </a:r>
-          </a:p>
-        </p:txBody>
-      </p:sp>
-      <p:sp>
-        <p:nvSpPr>
-          <p:cNvPr id="17" name="Flèche vers le bas 166">
-            <a:extLst>
-              <a:ext uri="{FF2B5EF4-FFF2-40B4-BE49-F238E27FC236}">
-                <a16:creationId xmlns:a16="http://schemas.microsoft.com/office/drawing/2014/main" id="{7D18DBE3-6929-4772-A8E5-CF6E2B2566A1}"/>
-              </a:ext>
-            </a:extLst>
-          </p:cNvPr>
-          <p:cNvSpPr/>
-          <p:nvPr/>
-        </p:nvSpPr>
-        <p:spPr>
-          <a:xfrm>
-            <a:off x="1815298" y="2075421"/>
-            <a:ext cx="232899" cy="3202111"/>
-          </a:xfrm>
-          <a:prstGeom prst="downArrow">
-            <a:avLst/>
-          </a:prstGeom>
-          <a:solidFill>
-            <a:schemeClr val="bg2">
-              <a:lumMod val="50000"/>
-            </a:schemeClr>
-          </a:solidFill>
-          <a:ln>
-            <a:noFill/>
-          </a:ln>
-          <a:effectLst/>
-        </p:spPr>
-        <p:style>
-          <a:lnRef idx="2">
-            <a:schemeClr val="dk1">
-              <a:shade val="50000"/>
-            </a:schemeClr>
-          </a:lnRef>
-          <a:fillRef idx="1">
-            <a:schemeClr val="dk1"/>
-          </a:fillRef>
-          <a:effectRef idx="0">
-            <a:schemeClr val="dk1"/>
-          </a:effectRef>
-          <a:fontRef idx="minor">
-            <a:schemeClr val="lt1"/>
-          </a:fontRef>
-        </p:style>
-        <p:txBody>
-          <a:bodyPr rtlCol="0" anchor="ctr"/>
-          <a:lstStyle/>
-          <a:p>
-            <a:pPr algn="ctr"/>
-            <a:endParaRPr lang="en-US" sz="1000" b="1" dirty="0">
-              <a:solidFill>
-                <a:schemeClr val="bg1"/>
-              </a:solidFill>
-              <a:cs typeface="Arial" panose="020B0604020202020204" pitchFamily="34" charset="0"/>
-            </a:endParaRPr>
-          </a:p>
-        </p:txBody>
-      </p:sp>
-      <p:sp>
-        <p:nvSpPr>
-          <p:cNvPr id="2" name="Flèche vers le bas 172">
-            <a:extLst>
-              <a:ext uri="{FF2B5EF4-FFF2-40B4-BE49-F238E27FC236}">
-                <a16:creationId xmlns:a16="http://schemas.microsoft.com/office/drawing/2014/main" id="{7DF910F7-A211-4AB5-83CF-7B43D6048AE5}"/>
-              </a:ext>
-            </a:extLst>
-          </p:cNvPr>
-          <p:cNvSpPr/>
-          <p:nvPr/>
-        </p:nvSpPr>
-        <p:spPr>
-          <a:xfrm>
-            <a:off x="5699421" y="2450867"/>
-            <a:ext cx="202333" cy="599700"/>
-          </a:xfrm>
-          <a:prstGeom prst="downArrow">
-            <a:avLst/>
-          </a:prstGeom>
-          <a:solidFill>
-            <a:schemeClr val="bg2">
-              <a:lumMod val="50000"/>
-            </a:schemeClr>
-          </a:solidFill>
-          <a:ln>
-            <a:noFill/>
-          </a:ln>
-          <a:effectLst/>
-        </p:spPr>
-        <p:style>
-          <a:lnRef idx="2">
-            <a:schemeClr val="dk1">
-              <a:shade val="50000"/>
-            </a:schemeClr>
-          </a:lnRef>
-          <a:fillRef idx="1">
-            <a:schemeClr val="dk1"/>
-          </a:fillRef>
-          <a:effectRef idx="0">
-            <a:schemeClr val="dk1"/>
-          </a:effectRef>
-          <a:fontRef idx="minor">
-            <a:schemeClr val="lt1"/>
-          </a:fontRef>
-        </p:style>
-        <p:txBody>
-          <a:bodyPr rtlCol="0" anchor="ctr"/>
-          <a:lstStyle/>
-          <a:p>
-            <a:pPr algn="ctr"/>
-            <a:endParaRPr lang="en-US" sz="1000" b="1" dirty="0">
-              <a:solidFill>
-                <a:schemeClr val="bg1"/>
-              </a:solidFill>
-              <a:cs typeface="Arial" panose="020B0604020202020204" pitchFamily="34" charset="0"/>
-            </a:endParaRPr>
-          </a:p>
-        </p:txBody>
-      </p:sp>
-      <p:cxnSp>
-        <p:nvCxnSpPr>
-          <p:cNvPr id="8" name="Straight Arrow Connector 7">
-            <a:extLst>
-              <a:ext uri="{FF2B5EF4-FFF2-40B4-BE49-F238E27FC236}">
-                <a16:creationId xmlns:a16="http://schemas.microsoft.com/office/drawing/2014/main" id="{B790D018-C1F0-49A5-9832-1701BD56BCEA}"/>
-              </a:ext>
-            </a:extLst>
-          </p:cNvPr>
-          <p:cNvCxnSpPr/>
-          <p:nvPr/>
-        </p:nvCxnSpPr>
-        <p:spPr>
-          <a:xfrm>
-            <a:off x="4223792" y="2636912"/>
-            <a:ext cx="2211099" cy="1816759"/>
-          </a:xfrm>
-          <a:prstGeom prst="straightConnector1">
-            <a:avLst/>
-          </a:prstGeom>
-          <a:ln>
-            <a:solidFill>
-              <a:schemeClr val="bg2">
-                <a:lumMod val="50000"/>
-              </a:schemeClr>
-            </a:solidFill>
-            <a:prstDash val="dash"/>
-            <a:tailEnd type="triangle"/>
-          </a:ln>
-        </p:spPr>
-        <p:style>
-          <a:lnRef idx="1">
-            <a:schemeClr val="accent1"/>
-          </a:lnRef>
-          <a:fillRef idx="0">
-            <a:schemeClr val="accent1"/>
-          </a:fillRef>
-          <a:effectRef idx="0">
-            <a:schemeClr val="accent1"/>
-          </a:effectRef>
-          <a:fontRef idx="minor">
-            <a:schemeClr val="tx1"/>
-          </a:fontRef>
-        </p:style>
-      </p:cxnSp>
-      <p:grpSp>
-        <p:nvGrpSpPr>
-          <p:cNvPr id="7" name="Group 6">
-            <a:extLst>
-              <a:ext uri="{FF2B5EF4-FFF2-40B4-BE49-F238E27FC236}">
-                <a16:creationId xmlns:a16="http://schemas.microsoft.com/office/drawing/2014/main" id="{AB8CB246-0124-D03D-3067-1CAD6D5AC5C3}"/>
-              </a:ext>
-            </a:extLst>
-          </p:cNvPr>
-          <p:cNvGrpSpPr/>
-          <p:nvPr/>
-        </p:nvGrpSpPr>
-        <p:grpSpPr>
-          <a:xfrm>
-            <a:off x="5266702" y="2744102"/>
-            <a:ext cx="3169497" cy="360401"/>
-            <a:chOff x="5266702" y="2744102"/>
-            <a:chExt cx="6229898" cy="360401"/>
-          </a:xfrm>
-          <a:solidFill>
-            <a:schemeClr val="accent4"/>
-          </a:solidFill>
-        </p:grpSpPr>
-        <p:sp>
-          <p:nvSpPr>
-            <p:cNvPr id="78" name="Rectangle 77">
-              <a:extLst>
-                <a:ext uri="{FF2B5EF4-FFF2-40B4-BE49-F238E27FC236}">
-                  <a16:creationId xmlns:a16="http://schemas.microsoft.com/office/drawing/2014/main" id="{9231B7A4-328C-4A38-A75D-D80D47B94C66}"/>
-                </a:ext>
-              </a:extLst>
-            </p:cNvPr>
-            <p:cNvSpPr/>
-            <p:nvPr/>
-          </p:nvSpPr>
-          <p:spPr>
-            <a:xfrm>
-              <a:off x="5266702" y="2753028"/>
-              <a:ext cx="6229898" cy="351475"/>
-            </a:xfrm>
-            <a:prstGeom prst="rect">
-              <a:avLst/>
-            </a:prstGeom>
-            <a:grpFill/>
-            <a:ln>
-              <a:noFill/>
-            </a:ln>
-            <a:effectLst/>
-          </p:spPr>
-          <p:style>
-            <a:lnRef idx="2">
-              <a:schemeClr val="dk1">
-                <a:shade val="50000"/>
-              </a:schemeClr>
-            </a:lnRef>
-            <a:fillRef idx="1">
-              <a:schemeClr val="dk1"/>
-            </a:fillRef>
-            <a:effectRef idx="0">
-              <a:schemeClr val="dk1"/>
-            </a:effectRef>
-            <a:fontRef idx="minor">
-              <a:schemeClr val="lt1"/>
-            </a:fontRef>
-          </p:style>
-          <p:txBody>
-            <a:bodyPr rtlCol="0" anchor="ctr"/>
-            <a:lstStyle/>
-            <a:p>
-              <a:pPr algn="ctr"/>
-              <a:r>
-                <a:rPr lang="en-US" sz="1000" b="1" dirty="0">
-                  <a:solidFill>
-                    <a:schemeClr val="bg1"/>
-                  </a:solidFill>
-                  <a:cs typeface="Arial" panose="020B0604020202020204" pitchFamily="34" charset="0"/>
-                </a:rPr>
-                <a:t>Bytecode Verifier</a:t>
-              </a:r>
-            </a:p>
-          </p:txBody>
-        </p:sp>
-        <p:pic>
-          <p:nvPicPr>
-            <p:cNvPr id="77" name="Picture 76">
-              <a:extLst>
-                <a:ext uri="{FF2B5EF4-FFF2-40B4-BE49-F238E27FC236}">
-                  <a16:creationId xmlns:a16="http://schemas.microsoft.com/office/drawing/2014/main" id="{7EB13A27-2986-4F83-B31B-75F4EDD7E2BB}"/>
-                </a:ext>
-              </a:extLst>
-            </p:cNvPr>
-            <p:cNvPicPr>
-              <a:picLocks noChangeAspect="1"/>
-            </p:cNvPicPr>
-            <p:nvPr/>
-          </p:nvPicPr>
-          <p:blipFill>
-            <a:blip r:embed="rId4" cstate="print">
-              <a:extLst>
-                <a:ext uri="{28A0092B-C50C-407E-A947-70E740481C1C}">
-                  <a14:useLocalDpi xmlns:a14="http://schemas.microsoft.com/office/drawing/2010/main" val="0"/>
-                </a:ext>
-              </a:extLst>
-            </a:blip>
-            <a:stretch>
-              <a:fillRect/>
-            </a:stretch>
-          </p:blipFill>
-          <p:spPr>
-            <a:xfrm>
-              <a:off x="6434891" y="2744102"/>
-              <a:ext cx="313698" cy="351475"/>
-            </a:xfrm>
-            <a:prstGeom prst="rect">
-              <a:avLst/>
-            </a:prstGeom>
-            <a:grpFill/>
-          </p:spPr>
-        </p:pic>
-      </p:grpSp>
-    </p:spTree>
-    <p:extLst>
-      <p:ext uri="{BB962C8B-B14F-4D97-AF65-F5344CB8AC3E}">
-        <p14:creationId xmlns:p14="http://schemas.microsoft.com/office/powerpoint/2010/main" val="2173038861"/>
-      </p:ext>
-    </p:extLst>
-  </p:cSld>
-  <p:clrMapOvr>
-    <a:masterClrMapping/>
-  </p:clrMapOvr>
-  <mc:AlternateContent xmlns:mc="http://schemas.openxmlformats.org/markup-compatibility/2006" xmlns:p14="http://schemas.microsoft.com/office/powerpoint/2010/main">
-    <mc:Choice Requires="p14">
-      <p:transition spd="med" p14:dur="700">
-        <p:fade/>
-      </p:transition>
-    </mc:Choice>
-    <mc:Fallback xmlns="">
-      <p:transition spd="med">
-        <p:fade/>
-      </p:transition>
-    </mc:Fallback>
-  </mc:AlternateContent>
 </p:sld>
 </file>
 

</xml_diff>